<commit_message>
Ninject feature demo updates; cleaned up IoC demo template to ready it for live coding
</commit_message>
<xml_diff>
--- a/Dependency_Injection.pptx
+++ b/Dependency_Injection.pptx
@@ -5,28 +5,29 @@
     <p:sldMasterId id="2147483840" r:id="rId1"/>
   </p:sldMasterIdLst>
   <p:sldIdLst>
-    <p:sldId id="256" r:id="rId2"/>
-    <p:sldId id="274" r:id="rId3"/>
-    <p:sldId id="267" r:id="rId4"/>
-    <p:sldId id="263" r:id="rId5"/>
-    <p:sldId id="268" r:id="rId6"/>
-    <p:sldId id="280" r:id="rId7"/>
-    <p:sldId id="264" r:id="rId8"/>
-    <p:sldId id="265" r:id="rId9"/>
-    <p:sldId id="266" r:id="rId10"/>
-    <p:sldId id="260" r:id="rId11"/>
-    <p:sldId id="282" r:id="rId12"/>
-    <p:sldId id="259" r:id="rId13"/>
-    <p:sldId id="269" r:id="rId14"/>
-    <p:sldId id="273" r:id="rId15"/>
-    <p:sldId id="270" r:id="rId16"/>
-    <p:sldId id="276" r:id="rId17"/>
-    <p:sldId id="271" r:id="rId18"/>
-    <p:sldId id="283" r:id="rId19"/>
-    <p:sldId id="272" r:id="rId20"/>
-    <p:sldId id="284" r:id="rId21"/>
-    <p:sldId id="261" r:id="rId22"/>
-    <p:sldId id="279" r:id="rId23"/>
+    <p:sldId id="285" r:id="rId2"/>
+    <p:sldId id="256" r:id="rId3"/>
+    <p:sldId id="274" r:id="rId4"/>
+    <p:sldId id="267" r:id="rId5"/>
+    <p:sldId id="263" r:id="rId6"/>
+    <p:sldId id="268" r:id="rId7"/>
+    <p:sldId id="280" r:id="rId8"/>
+    <p:sldId id="264" r:id="rId9"/>
+    <p:sldId id="265" r:id="rId10"/>
+    <p:sldId id="266" r:id="rId11"/>
+    <p:sldId id="260" r:id="rId12"/>
+    <p:sldId id="282" r:id="rId13"/>
+    <p:sldId id="259" r:id="rId14"/>
+    <p:sldId id="269" r:id="rId15"/>
+    <p:sldId id="273" r:id="rId16"/>
+    <p:sldId id="270" r:id="rId17"/>
+    <p:sldId id="276" r:id="rId18"/>
+    <p:sldId id="271" r:id="rId19"/>
+    <p:sldId id="283" r:id="rId20"/>
+    <p:sldId id="272" r:id="rId21"/>
+    <p:sldId id="284" r:id="rId22"/>
+    <p:sldId id="261" r:id="rId23"/>
+    <p:sldId id="279" r:id="rId24"/>
   </p:sldIdLst>
   <p:sldSz cx="12192000" cy="6858000"/>
   <p:notesSz cx="6858000" cy="9144000"/>
@@ -127,7 +128,7 @@
   </p:defaultTextStyle>
   <p:extLst>
     <p:ext uri="{EFAFB233-063F-42B5-8137-9DF3F51BA10A}">
-      <p15:sldGuideLst xmlns:p15="http://schemas.microsoft.com/office/powerpoint/2012/main">
+      <p15:sldGuideLst xmlns="" xmlns:p15="http://schemas.microsoft.com/office/powerpoint/2012/main">
         <p15:guide id="1" orient="horz" pos="2160">
           <p15:clr>
             <a:srgbClr val="A4A3A4"/>
@@ -369,7 +370,7 @@
             <a:fld id="{5586B75A-687E-405C-8A0B-8D00578BA2C3}" type="datetimeFigureOut">
               <a:rPr lang="en-US" dirty="0"/>
               <a:pPr/>
-              <a:t>8/10/2014</a:t>
+              <a:t>8/12/2014</a:t>
             </a:fld>
             <a:endParaRPr lang="en-US" dirty="0"/>
           </a:p>
@@ -536,7 +537,7 @@
             <a:fld id="{5586B75A-687E-405C-8A0B-8D00578BA2C3}" type="datetimeFigureOut">
               <a:rPr lang="en-US" dirty="0"/>
               <a:pPr/>
-              <a:t>8/10/2014</a:t>
+              <a:t>8/12/2014</a:t>
             </a:fld>
             <a:endParaRPr lang="en-US" dirty="0"/>
           </a:p>
@@ -713,7 +714,7 @@
             <a:fld id="{5586B75A-687E-405C-8A0B-8D00578BA2C3}" type="datetimeFigureOut">
               <a:rPr lang="en-US" dirty="0"/>
               <a:pPr/>
-              <a:t>8/10/2014</a:t>
+              <a:t>8/12/2014</a:t>
             </a:fld>
             <a:endParaRPr lang="en-US" dirty="0"/>
           </a:p>
@@ -880,7 +881,7 @@
             <a:fld id="{5586B75A-687E-405C-8A0B-8D00578BA2C3}" type="datetimeFigureOut">
               <a:rPr lang="en-US" dirty="0"/>
               <a:pPr/>
-              <a:t>8/10/2014</a:t>
+              <a:t>8/12/2014</a:t>
             </a:fld>
             <a:endParaRPr lang="en-US" dirty="0"/>
           </a:p>
@@ -1135,7 +1136,7 @@
             <a:fld id="{5586B75A-687E-405C-8A0B-8D00578BA2C3}" type="datetimeFigureOut">
               <a:rPr lang="en-US" dirty="0"/>
               <a:pPr/>
-              <a:t>8/10/2014</a:t>
+              <a:t>8/12/2014</a:t>
             </a:fld>
             <a:endParaRPr lang="en-US" dirty="0"/>
           </a:p>
@@ -1420,7 +1421,7 @@
             <a:fld id="{5586B75A-687E-405C-8A0B-8D00578BA2C3}" type="datetimeFigureOut">
               <a:rPr lang="en-US" dirty="0"/>
               <a:pPr/>
-              <a:t>8/10/2014</a:t>
+              <a:t>8/12/2014</a:t>
             </a:fld>
             <a:endParaRPr lang="en-US" dirty="0"/>
           </a:p>
@@ -1859,7 +1860,7 @@
             <a:fld id="{5586B75A-687E-405C-8A0B-8D00578BA2C3}" type="datetimeFigureOut">
               <a:rPr lang="en-US" dirty="0"/>
               <a:pPr/>
-              <a:t>8/10/2014</a:t>
+              <a:t>8/12/2014</a:t>
             </a:fld>
             <a:endParaRPr lang="en-US" dirty="0"/>
           </a:p>
@@ -1974,7 +1975,7 @@
             <a:fld id="{5586B75A-687E-405C-8A0B-8D00578BA2C3}" type="datetimeFigureOut">
               <a:rPr lang="en-US" dirty="0"/>
               <a:pPr/>
-              <a:t>8/10/2014</a:t>
+              <a:t>8/12/2014</a:t>
             </a:fld>
             <a:endParaRPr lang="en-US" dirty="0"/>
           </a:p>
@@ -2066,7 +2067,7 @@
             <a:fld id="{5586B75A-687E-405C-8A0B-8D00578BA2C3}" type="datetimeFigureOut">
               <a:rPr lang="en-US" dirty="0"/>
               <a:pPr/>
-              <a:t>8/10/2014</a:t>
+              <a:t>8/12/2014</a:t>
             </a:fld>
             <a:endParaRPr lang="en-US" dirty="0"/>
           </a:p>
@@ -2351,7 +2352,7 @@
             <a:fld id="{5586B75A-687E-405C-8A0B-8D00578BA2C3}" type="datetimeFigureOut">
               <a:rPr lang="en-US" dirty="0"/>
               <a:pPr/>
-              <a:t>8/10/2014</a:t>
+              <a:t>8/12/2014</a:t>
             </a:fld>
             <a:endParaRPr lang="en-US" dirty="0"/>
           </a:p>
@@ -2621,7 +2622,7 @@
             <a:fld id="{5586B75A-687E-405C-8A0B-8D00578BA2C3}" type="datetimeFigureOut">
               <a:rPr lang="en-US" dirty="0"/>
               <a:pPr/>
-              <a:t>8/10/2014</a:t>
+              <a:t>8/12/2014</a:t>
             </a:fld>
             <a:endParaRPr lang="en-US" dirty="0"/>
           </a:p>
@@ -2915,7 +2916,7 @@
             <a:fld id="{5586B75A-687E-405C-8A0B-8D00578BA2C3}" type="datetimeFigureOut">
               <a:rPr lang="en-US" dirty="0"/>
               <a:pPr/>
-              <a:t>8/10/2014</a:t>
+              <a:t>8/12/2014</a:t>
             </a:fld>
             <a:endParaRPr lang="en-US" dirty="0"/>
           </a:p>
@@ -3401,7 +3402,7 @@
             <a:spLocks noGrp="1"/>
           </p:cNvSpPr>
           <p:nvPr>
-            <p:ph type="ctrTitle"/>
+            <p:ph type="title"/>
           </p:nvPr>
         </p:nvSpPr>
         <p:spPr/>
@@ -3409,50 +3410,123 @@
           <a:bodyPr/>
           <a:lstStyle/>
           <a:p>
-            <a:r>
-              <a:rPr lang="en-US" dirty="0" smtClean="0"/>
-              <a:t>Inversion of Control</a:t>
-            </a:r>
-            <a:endParaRPr lang="en-US" dirty="0"/>
-          </a:p>
-        </p:txBody>
-      </p:sp>
-      <p:sp>
-        <p:nvSpPr>
-          <p:cNvPr id="3" name="Subtitle 2"/>
-          <p:cNvSpPr>
-            <a:spLocks noGrp="1"/>
-          </p:cNvSpPr>
-          <p:nvPr>
-            <p:ph type="subTitle" idx="1"/>
-          </p:nvPr>
-        </p:nvSpPr>
-        <p:spPr>
-          <a:xfrm>
-            <a:off x="1229106" y="4724034"/>
-            <a:ext cx="7315200" cy="914400"/>
-          </a:xfrm>
-        </p:spPr>
-        <p:txBody>
-          <a:bodyPr/>
-          <a:lstStyle/>
-          <a:p>
-            <a:r>
-              <a:rPr lang="en-US" dirty="0" smtClean="0"/>
-              <a:t>An introduction to </a:t>
+            <a:endParaRPr lang="en-US" dirty="0"/>
+          </a:p>
+        </p:txBody>
+      </p:sp>
+      <p:sp>
+        <p:nvSpPr>
+          <p:cNvPr id="3" name="Content Placeholder 2"/>
+          <p:cNvSpPr>
+            <a:spLocks noGrp="1"/>
+          </p:cNvSpPr>
+          <p:nvPr>
+            <p:ph idx="1"/>
+          </p:nvPr>
+        </p:nvSpPr>
+        <p:spPr/>
+        <p:txBody>
+          <a:bodyPr>
+            <a:normAutofit/>
+          </a:bodyPr>
+          <a:lstStyle/>
+          <a:p>
+            <a:pPr marL="0" indent="0">
+              <a:buNone/>
+            </a:pPr>
+            <a:r>
+              <a:rPr lang="en-US" sz="3200" dirty="0" smtClean="0"/>
+              <a:t>Steven Testa</a:t>
+            </a:r>
+            <a:br>
+              <a:rPr lang="en-US" sz="3200" dirty="0" smtClean="0"/>
+            </a:br>
+            <a:r>
+              <a:rPr lang="en-US" dirty="0" smtClean="0"/>
+              <a:t>MCTS, CDIA+, </a:t>
             </a:r>
             <a:r>
               <a:rPr lang="en-US" dirty="0" err="1" smtClean="0"/>
-              <a:t>IoC</a:t>
-            </a:r>
-            <a:endParaRPr lang="en-US" dirty="0"/>
+              <a:t>ECMp</a:t>
+            </a:r>
+            <a:r>
+              <a:rPr lang="en-US" dirty="0" smtClean="0"/>
+              <a:t> </a:t>
+            </a:r>
+            <a:endParaRPr lang="en-US" sz="3200" dirty="0"/>
+          </a:p>
+          <a:p>
+            <a:r>
+              <a:rPr lang="en-US" dirty="0" smtClean="0"/>
+              <a:t>Applications Developer, Hyland Software</a:t>
+            </a:r>
+          </a:p>
+          <a:p>
+            <a:r>
+              <a:rPr lang="en-US" dirty="0" smtClean="0"/>
+              <a:t>Owner/Developer, Testa Software</a:t>
+            </a:r>
+          </a:p>
+          <a:p>
+            <a:endParaRPr lang="en-US" dirty="0"/>
+          </a:p>
+          <a:p>
+            <a:pPr marL="0" indent="0">
+              <a:buNone/>
+            </a:pPr>
+            <a:r>
+              <a:rPr lang="en-US" dirty="0" smtClean="0"/>
+              <a:t>Email: steve@testasoftware.com</a:t>
+            </a:r>
+            <a:r>
+              <a:rPr lang="en-US" dirty="0"/>
+              <a:t/>
+            </a:r>
+            <a:br>
+              <a:rPr lang="en-US" dirty="0"/>
+            </a:br>
+            <a:r>
+              <a:rPr lang="en-US" dirty="0" smtClean="0"/>
+              <a:t>Twitter: @</a:t>
+            </a:r>
+            <a:r>
+              <a:rPr lang="en-US" dirty="0" err="1" smtClean="0"/>
+              <a:t>steven_testa</a:t>
+            </a:r>
+            <a:r>
+              <a:rPr lang="en-US" dirty="0" smtClean="0"/>
+              <a:t/>
+            </a:r>
+            <a:br>
+              <a:rPr lang="en-US" dirty="0" smtClean="0"/>
+            </a:br>
+            <a:r>
+              <a:rPr lang="en-US" dirty="0" smtClean="0"/>
+              <a:t>Website: http://testasoftware.com</a:t>
+            </a:r>
+          </a:p>
+          <a:p>
+            <a:pPr marL="0" indent="0">
+              <a:buNone/>
+            </a:pPr>
+            <a:endParaRPr lang="en-US" dirty="0" smtClean="0"/>
+          </a:p>
+          <a:p>
+            <a:pPr marL="0" indent="0">
+              <a:buNone/>
+            </a:pPr>
+            <a:r>
+              <a:rPr lang="en-US" dirty="0"/>
+              <a:t>Speaker Rate: http://speakerrate.com/steven-testa</a:t>
+            </a:r>
+            <a:endParaRPr lang="en-US" dirty="0" smtClean="0"/>
           </a:p>
         </p:txBody>
       </p:sp>
     </p:spTree>
     <p:extLst>
       <p:ext uri="{BB962C8B-B14F-4D97-AF65-F5344CB8AC3E}">
-        <p14:creationId xmlns:p14="http://schemas.microsoft.com/office/powerpoint/2010/main" val="2818525233"/>
+        <p14:creationId xmlns:p14="http://schemas.microsoft.com/office/powerpoint/2010/main" val="341000198"/>
       </p:ext>
     </p:extLst>
   </p:cSld>
@@ -3493,6 +3567,125 @@
             <a:spLocks noGrp="1"/>
           </p:cNvSpPr>
           <p:nvPr>
+            <p:ph type="title"/>
+          </p:nvPr>
+        </p:nvSpPr>
+        <p:spPr/>
+        <p:txBody>
+          <a:bodyPr/>
+          <a:lstStyle/>
+          <a:p>
+            <a:r>
+              <a:rPr lang="en-US" dirty="0" smtClean="0"/>
+              <a:t>Terminology</a:t>
+            </a:r>
+            <a:endParaRPr lang="en-US" dirty="0"/>
+          </a:p>
+        </p:txBody>
+      </p:sp>
+      <p:sp>
+        <p:nvSpPr>
+          <p:cNvPr id="3" name="Content Placeholder 2"/>
+          <p:cNvSpPr>
+            <a:spLocks noGrp="1"/>
+          </p:cNvSpPr>
+          <p:nvPr>
+            <p:ph idx="1"/>
+          </p:nvPr>
+        </p:nvSpPr>
+        <p:spPr/>
+        <p:txBody>
+          <a:bodyPr>
+            <a:normAutofit/>
+          </a:bodyPr>
+          <a:lstStyle/>
+          <a:p>
+            <a:pPr marL="0" indent="0" algn="ctr">
+              <a:buNone/>
+            </a:pPr>
+            <a:r>
+              <a:rPr lang="en-US" sz="3200" dirty="0" err="1" smtClean="0"/>
+              <a:t>IoC</a:t>
+            </a:r>
+            <a:r>
+              <a:rPr lang="en-US" sz="3200" dirty="0" smtClean="0"/>
+              <a:t> Container</a:t>
+            </a:r>
+          </a:p>
+          <a:p>
+            <a:r>
+              <a:rPr lang="en-US" dirty="0" smtClean="0"/>
+              <a:t>A framework for doing dependency injection.</a:t>
+            </a:r>
+          </a:p>
+          <a:p>
+            <a:r>
+              <a:rPr lang="en-US" dirty="0" smtClean="0"/>
+              <a:t>Popular containers include: Structure Map, </a:t>
+            </a:r>
+            <a:r>
+              <a:rPr lang="en-US" dirty="0" err="1" smtClean="0"/>
+              <a:t>Ninject</a:t>
+            </a:r>
+            <a:r>
+              <a:rPr lang="en-US" dirty="0" smtClean="0"/>
+              <a:t>, </a:t>
+            </a:r>
+            <a:r>
+              <a:rPr lang="en-US" dirty="0" err="1" smtClean="0"/>
+              <a:t>Castle.Windsor</a:t>
+            </a:r>
+            <a:r>
+              <a:rPr lang="en-US" dirty="0" smtClean="0"/>
+              <a:t>, Unity</a:t>
+            </a:r>
+          </a:p>
+        </p:txBody>
+      </p:sp>
+    </p:spTree>
+    <p:extLst>
+      <p:ext uri="{BB962C8B-B14F-4D97-AF65-F5344CB8AC3E}">
+        <p14:creationId xmlns:p14="http://schemas.microsoft.com/office/powerpoint/2010/main" val="999399664"/>
+      </p:ext>
+    </p:extLst>
+  </p:cSld>
+  <p:clrMapOvr>
+    <a:masterClrMapping/>
+  </p:clrMapOvr>
+  <p:timing>
+    <p:tnLst>
+      <p:par>
+        <p:cTn id="1" dur="indefinite" restart="never" nodeType="tmRoot"/>
+      </p:par>
+    </p:tnLst>
+  </p:timing>
+</p:sld>
+</file>
+
+<file path=ppt/slides/slide11.xml><?xml version="1.0" encoding="utf-8"?>
+<p:sld xmlns:a="http://schemas.openxmlformats.org/drawingml/2006/main" xmlns:r="http://schemas.openxmlformats.org/officeDocument/2006/relationships" xmlns:p="http://schemas.openxmlformats.org/presentationml/2006/main">
+  <p:cSld>
+    <p:spTree>
+      <p:nvGrpSpPr>
+        <p:cNvPr id="1" name=""/>
+        <p:cNvGrpSpPr/>
+        <p:nvPr/>
+      </p:nvGrpSpPr>
+      <p:grpSpPr>
+        <a:xfrm>
+          <a:off x="0" y="0"/>
+          <a:ext cx="0" cy="0"/>
+          <a:chOff x="0" y="0"/>
+          <a:chExt cx="0" cy="0"/>
+        </a:xfrm>
+      </p:grpSpPr>
+      <p:sp>
+        <p:nvSpPr>
+          <p:cNvPr id="2" name="Title 1"/>
+          <p:cNvSpPr>
+            <a:spLocks noGrp="1"/>
+          </p:cNvSpPr>
+          <p:nvPr>
             <p:ph type="ctrTitle"/>
           </p:nvPr>
         </p:nvSpPr>
@@ -3560,7 +3753,7 @@
 </p:sld>
 </file>
 
-<file path=ppt/slides/slide11.xml><?xml version="1.0" encoding="utf-8"?>
+<file path=ppt/slides/slide12.xml><?xml version="1.0" encoding="utf-8"?>
 <p:sld xmlns:a="http://schemas.openxmlformats.org/drawingml/2006/main" xmlns:r="http://schemas.openxmlformats.org/officeDocument/2006/relationships" xmlns:p="http://schemas.openxmlformats.org/presentationml/2006/main">
   <p:cSld>
     <p:spTree>
@@ -3788,7 +3981,7 @@
 </p:sld>
 </file>
 
-<file path=ppt/slides/slide12.xml><?xml version="1.0" encoding="utf-8"?>
+<file path=ppt/slides/slide13.xml><?xml version="1.0" encoding="utf-8"?>
 <p:sld xmlns:a="http://schemas.openxmlformats.org/drawingml/2006/main" xmlns:r="http://schemas.openxmlformats.org/officeDocument/2006/relationships" xmlns:p="http://schemas.openxmlformats.org/presentationml/2006/main">
   <p:cSld>
     <p:spTree>
@@ -3849,132 +4042,6 @@
 </p:sld>
 </file>
 
-<file path=ppt/slides/slide13.xml><?xml version="1.0" encoding="utf-8"?>
-<p:sld xmlns:a="http://schemas.openxmlformats.org/drawingml/2006/main" xmlns:r="http://schemas.openxmlformats.org/officeDocument/2006/relationships" xmlns:p="http://schemas.openxmlformats.org/presentationml/2006/main">
-  <p:cSld>
-    <p:spTree>
-      <p:nvGrpSpPr>
-        <p:cNvPr id="1" name=""/>
-        <p:cNvGrpSpPr/>
-        <p:nvPr/>
-      </p:nvGrpSpPr>
-      <p:grpSpPr>
-        <a:xfrm>
-          <a:off x="0" y="0"/>
-          <a:ext cx="0" cy="0"/>
-          <a:chOff x="0" y="0"/>
-          <a:chExt cx="0" cy="0"/>
-        </a:xfrm>
-      </p:grpSpPr>
-      <p:sp>
-        <p:nvSpPr>
-          <p:cNvPr id="2" name="Title 1"/>
-          <p:cNvSpPr>
-            <a:spLocks noGrp="1"/>
-          </p:cNvSpPr>
-          <p:nvPr>
-            <p:ph type="title"/>
-          </p:nvPr>
-        </p:nvSpPr>
-        <p:spPr/>
-        <p:txBody>
-          <a:bodyPr/>
-          <a:lstStyle/>
-          <a:p>
-            <a:r>
-              <a:rPr lang="en-US" dirty="0" smtClean="0"/>
-              <a:t>Why do I care?</a:t>
-            </a:r>
-            <a:endParaRPr lang="en-US" dirty="0"/>
-          </a:p>
-        </p:txBody>
-      </p:sp>
-      <p:sp>
-        <p:nvSpPr>
-          <p:cNvPr id="3" name="Content Placeholder 2"/>
-          <p:cNvSpPr>
-            <a:spLocks noGrp="1"/>
-          </p:cNvSpPr>
-          <p:nvPr>
-            <p:ph idx="1"/>
-          </p:nvPr>
-        </p:nvSpPr>
-        <p:spPr/>
-        <p:txBody>
-          <a:bodyPr/>
-          <a:lstStyle/>
-          <a:p>
-            <a:r>
-              <a:rPr lang="en-US" dirty="0" smtClean="0"/>
-              <a:t>Same reasons for using a factory pattern</a:t>
-            </a:r>
-            <a:r>
-              <a:rPr lang="en-US" dirty="0" smtClean="0"/>
-              <a:t>.</a:t>
-            </a:r>
-          </a:p>
-          <a:p>
-            <a:r>
-              <a:rPr lang="en-US" dirty="0" smtClean="0"/>
-              <a:t>Single Responsibility Principle</a:t>
-            </a:r>
-            <a:r>
-              <a:rPr lang="en-US" dirty="0" smtClean="0"/>
-              <a:t> </a:t>
-            </a:r>
-            <a:endParaRPr lang="en-US" dirty="0" smtClean="0"/>
-          </a:p>
-          <a:p>
-            <a:r>
-              <a:rPr lang="en-US" dirty="0" smtClean="0"/>
-              <a:t>Loose Coupling</a:t>
-            </a:r>
-            <a:endParaRPr lang="en-US" dirty="0" smtClean="0"/>
-          </a:p>
-          <a:p>
-            <a:r>
-              <a:rPr lang="en-US" dirty="0" smtClean="0"/>
-              <a:t>Modularity and Code Reuse </a:t>
-            </a:r>
-          </a:p>
-          <a:p>
-            <a:r>
-              <a:rPr lang="en-US" dirty="0" smtClean="0"/>
-              <a:t>Maintainability</a:t>
-            </a:r>
-          </a:p>
-          <a:p>
-            <a:r>
-              <a:rPr lang="en-US" dirty="0" smtClean="0"/>
-              <a:t>Testability</a:t>
-            </a:r>
-            <a:endParaRPr lang="en-US" dirty="0"/>
-          </a:p>
-          <a:p>
-            <a:endParaRPr lang="en-US" dirty="0"/>
-          </a:p>
-        </p:txBody>
-      </p:sp>
-    </p:spTree>
-    <p:extLst>
-      <p:ext uri="{BB962C8B-B14F-4D97-AF65-F5344CB8AC3E}">
-        <p14:creationId xmlns:p14="http://schemas.microsoft.com/office/powerpoint/2010/main" val="3338046324"/>
-      </p:ext>
-    </p:extLst>
-  </p:cSld>
-  <p:clrMapOvr>
-    <a:masterClrMapping/>
-  </p:clrMapOvr>
-  <p:timing>
-    <p:tnLst>
-      <p:par>
-        <p:cTn id="1" dur="indefinite" restart="never" nodeType="tmRoot"/>
-      </p:par>
-    </p:tnLst>
-  </p:timing>
-</p:sld>
-</file>
-
 <file path=ppt/slides/slide14.xml><?xml version="1.0" encoding="utf-8"?>
 <p:sld xmlns:a="http://schemas.openxmlformats.org/drawingml/2006/main" xmlns:r="http://schemas.openxmlformats.org/officeDocument/2006/relationships" xmlns:p="http://schemas.openxmlformats.org/presentationml/2006/main">
   <p:cSld>
@@ -4007,17 +4074,9 @@
           <a:bodyPr/>
           <a:lstStyle/>
           <a:p>
-            <a:pPr algn="ctr"/>
-            <a:r>
-              <a:rPr lang="en-US" dirty="0" smtClean="0"/>
-              <a:t>Danger, </a:t>
-            </a:r>
-            <a:br>
-              <a:rPr lang="en-US" dirty="0" smtClean="0"/>
-            </a:br>
-            <a:r>
-              <a:rPr lang="en-US" dirty="0" smtClean="0"/>
-              <a:t>Will Robinson! </a:t>
+            <a:r>
+              <a:rPr lang="en-US" dirty="0" smtClean="0"/>
+              <a:t>Why do I care?</a:t>
             </a:r>
             <a:endParaRPr lang="en-US" dirty="0"/>
           </a:p>
@@ -4040,27 +4099,49 @@
           <a:p>
             <a:r>
               <a:rPr lang="en-US" dirty="0" smtClean="0"/>
-              <a:t>Leaks the internal implementation details of the class</a:t>
-            </a:r>
-          </a:p>
-          <a:p>
-            <a:r>
-              <a:rPr lang="en-US" dirty="0" smtClean="0"/>
-              <a:t>Prevents deferred creation</a:t>
-            </a:r>
-          </a:p>
-          <a:p>
-            <a:r>
-              <a:rPr lang="en-US" dirty="0" smtClean="0"/>
-              <a:t>Shelters pain points</a:t>
-            </a:r>
+              <a:t>Same reasons for using a factory pattern.</a:t>
+            </a:r>
+          </a:p>
+          <a:p>
+            <a:r>
+              <a:rPr lang="en-US" dirty="0" smtClean="0"/>
+              <a:t>Single Responsibility Principle </a:t>
+            </a:r>
+          </a:p>
+          <a:p>
+            <a:r>
+              <a:rPr lang="en-US" dirty="0" smtClean="0"/>
+              <a:t>Loose Coupling</a:t>
+            </a:r>
+          </a:p>
+          <a:p>
+            <a:r>
+              <a:rPr lang="en-US" dirty="0" smtClean="0"/>
+              <a:t>Modularity and Code Reuse </a:t>
+            </a:r>
+          </a:p>
+          <a:p>
+            <a:r>
+              <a:rPr lang="en-US" dirty="0" smtClean="0"/>
+              <a:t>Maintainability</a:t>
+            </a:r>
+          </a:p>
+          <a:p>
+            <a:r>
+              <a:rPr lang="en-US" dirty="0" smtClean="0"/>
+              <a:t>Testability</a:t>
+            </a:r>
+            <a:endParaRPr lang="en-US" dirty="0"/>
+          </a:p>
+          <a:p>
+            <a:endParaRPr lang="en-US" dirty="0"/>
           </a:p>
         </p:txBody>
       </p:sp>
     </p:spTree>
     <p:extLst>
       <p:ext uri="{BB962C8B-B14F-4D97-AF65-F5344CB8AC3E}">
-        <p14:creationId xmlns:p14="http://schemas.microsoft.com/office/powerpoint/2010/main" val="3228708936"/>
+        <p14:creationId xmlns:p14="http://schemas.microsoft.com/office/powerpoint/2010/main" val="3338046324"/>
       </p:ext>
     </p:extLst>
   </p:cSld>
@@ -4109,6 +4190,108 @@
           <a:bodyPr/>
           <a:lstStyle/>
           <a:p>
+            <a:pPr algn="ctr"/>
+            <a:r>
+              <a:rPr lang="en-US" dirty="0" smtClean="0"/>
+              <a:t>Danger, </a:t>
+            </a:r>
+            <a:br>
+              <a:rPr lang="en-US" dirty="0" smtClean="0"/>
+            </a:br>
+            <a:r>
+              <a:rPr lang="en-US" dirty="0" smtClean="0"/>
+              <a:t>Will Robinson! </a:t>
+            </a:r>
+            <a:endParaRPr lang="en-US" dirty="0"/>
+          </a:p>
+        </p:txBody>
+      </p:sp>
+      <p:sp>
+        <p:nvSpPr>
+          <p:cNvPr id="3" name="Content Placeholder 2"/>
+          <p:cNvSpPr>
+            <a:spLocks noGrp="1"/>
+          </p:cNvSpPr>
+          <p:nvPr>
+            <p:ph idx="1"/>
+          </p:nvPr>
+        </p:nvSpPr>
+        <p:spPr/>
+        <p:txBody>
+          <a:bodyPr/>
+          <a:lstStyle/>
+          <a:p>
+            <a:r>
+              <a:rPr lang="en-US" dirty="0" smtClean="0"/>
+              <a:t>Leaks the internal implementation details of the class</a:t>
+            </a:r>
+          </a:p>
+          <a:p>
+            <a:r>
+              <a:rPr lang="en-US" dirty="0" smtClean="0"/>
+              <a:t>Prevents deferred creation</a:t>
+            </a:r>
+          </a:p>
+          <a:p>
+            <a:r>
+              <a:rPr lang="en-US" dirty="0" smtClean="0"/>
+              <a:t>Shelters pain points</a:t>
+            </a:r>
+          </a:p>
+        </p:txBody>
+      </p:sp>
+    </p:spTree>
+    <p:extLst>
+      <p:ext uri="{BB962C8B-B14F-4D97-AF65-F5344CB8AC3E}">
+        <p14:creationId xmlns:p14="http://schemas.microsoft.com/office/powerpoint/2010/main" val="3228708936"/>
+      </p:ext>
+    </p:extLst>
+  </p:cSld>
+  <p:clrMapOvr>
+    <a:masterClrMapping/>
+  </p:clrMapOvr>
+  <p:timing>
+    <p:tnLst>
+      <p:par>
+        <p:cTn id="1" dur="indefinite" restart="never" nodeType="tmRoot"/>
+      </p:par>
+    </p:tnLst>
+  </p:timing>
+</p:sld>
+</file>
+
+<file path=ppt/slides/slide16.xml><?xml version="1.0" encoding="utf-8"?>
+<p:sld xmlns:a="http://schemas.openxmlformats.org/drawingml/2006/main" xmlns:r="http://schemas.openxmlformats.org/officeDocument/2006/relationships" xmlns:p="http://schemas.openxmlformats.org/presentationml/2006/main">
+  <p:cSld>
+    <p:spTree>
+      <p:nvGrpSpPr>
+        <p:cNvPr id="1" name=""/>
+        <p:cNvGrpSpPr/>
+        <p:nvPr/>
+      </p:nvGrpSpPr>
+      <p:grpSpPr>
+        <a:xfrm>
+          <a:off x="0" y="0"/>
+          <a:ext cx="0" cy="0"/>
+          <a:chOff x="0" y="0"/>
+          <a:chExt cx="0" cy="0"/>
+        </a:xfrm>
+      </p:grpSpPr>
+      <p:sp>
+        <p:nvSpPr>
+          <p:cNvPr id="2" name="Title 1"/>
+          <p:cNvSpPr>
+            <a:spLocks noGrp="1"/>
+          </p:cNvSpPr>
+          <p:nvPr>
+            <p:ph type="title"/>
+          </p:nvPr>
+        </p:nvSpPr>
+        <p:spPr/>
+        <p:txBody>
+          <a:bodyPr/>
+          <a:lstStyle/>
+          <a:p>
             <a:r>
               <a:rPr lang="en-US" dirty="0" smtClean="0"/>
               <a:t>Injection Types</a:t>
@@ -4219,7 +4402,7 @@
 </p:sld>
 </file>
 
-<file path=ppt/slides/slide16.xml><?xml version="1.0" encoding="utf-8"?>
+<file path=ppt/slides/slide17.xml><?xml version="1.0" encoding="utf-8"?>
 <p:sld xmlns:a="http://schemas.openxmlformats.org/drawingml/2006/main" xmlns:r="http://schemas.openxmlformats.org/officeDocument/2006/relationships" xmlns:p="http://schemas.openxmlformats.org/presentationml/2006/main">
   <p:cSld>
     <p:spTree>
@@ -4327,7 +4510,7 @@
 </p:sld>
 </file>
 
-<file path=ppt/slides/slide17.xml><?xml version="1.0" encoding="utf-8"?>
+<file path=ppt/slides/slide18.xml><?xml version="1.0" encoding="utf-8"?>
 <p:sld xmlns:a="http://schemas.openxmlformats.org/drawingml/2006/main" xmlns:r="http://schemas.openxmlformats.org/officeDocument/2006/relationships" xmlns:p="http://schemas.openxmlformats.org/presentationml/2006/main">
   <p:cSld>
     <p:spTree>
@@ -4455,7 +4638,7 @@
 </p:sld>
 </file>
 
-<file path=ppt/slides/slide18.xml><?xml version="1.0" encoding="utf-8"?>
+<file path=ppt/slides/slide19.xml><?xml version="1.0" encoding="utf-8"?>
 <p:sld xmlns:a="http://schemas.openxmlformats.org/drawingml/2006/main" xmlns:r="http://schemas.openxmlformats.org/officeDocument/2006/relationships" xmlns:p="http://schemas.openxmlformats.org/presentationml/2006/main">
   <p:cSld>
     <p:spTree>
@@ -4563,7 +4746,99 @@
 </p:sld>
 </file>
 
-<file path=ppt/slides/slide19.xml><?xml version="1.0" encoding="utf-8"?>
+<file path=ppt/slides/slide2.xml><?xml version="1.0" encoding="utf-8"?>
+<p:sld xmlns:a="http://schemas.openxmlformats.org/drawingml/2006/main" xmlns:r="http://schemas.openxmlformats.org/officeDocument/2006/relationships" xmlns:p="http://schemas.openxmlformats.org/presentationml/2006/main">
+  <p:cSld>
+    <p:spTree>
+      <p:nvGrpSpPr>
+        <p:cNvPr id="1" name=""/>
+        <p:cNvGrpSpPr/>
+        <p:nvPr/>
+      </p:nvGrpSpPr>
+      <p:grpSpPr>
+        <a:xfrm>
+          <a:off x="0" y="0"/>
+          <a:ext cx="0" cy="0"/>
+          <a:chOff x="0" y="0"/>
+          <a:chExt cx="0" cy="0"/>
+        </a:xfrm>
+      </p:grpSpPr>
+      <p:sp>
+        <p:nvSpPr>
+          <p:cNvPr id="2" name="Title 1"/>
+          <p:cNvSpPr>
+            <a:spLocks noGrp="1"/>
+          </p:cNvSpPr>
+          <p:nvPr>
+            <p:ph type="ctrTitle"/>
+          </p:nvPr>
+        </p:nvSpPr>
+        <p:spPr/>
+        <p:txBody>
+          <a:bodyPr/>
+          <a:lstStyle/>
+          <a:p>
+            <a:r>
+              <a:rPr lang="en-US" dirty="0" smtClean="0"/>
+              <a:t>Inversion of Control</a:t>
+            </a:r>
+            <a:endParaRPr lang="en-US" dirty="0"/>
+          </a:p>
+        </p:txBody>
+      </p:sp>
+      <p:sp>
+        <p:nvSpPr>
+          <p:cNvPr id="3" name="Subtitle 2"/>
+          <p:cNvSpPr>
+            <a:spLocks noGrp="1"/>
+          </p:cNvSpPr>
+          <p:nvPr>
+            <p:ph type="subTitle" idx="1"/>
+          </p:nvPr>
+        </p:nvSpPr>
+        <p:spPr>
+          <a:xfrm>
+            <a:off x="1229106" y="4724034"/>
+            <a:ext cx="7315200" cy="914400"/>
+          </a:xfrm>
+        </p:spPr>
+        <p:txBody>
+          <a:bodyPr/>
+          <a:lstStyle/>
+          <a:p>
+            <a:r>
+              <a:rPr lang="en-US" dirty="0" smtClean="0"/>
+              <a:t>An introduction to </a:t>
+            </a:r>
+            <a:r>
+              <a:rPr lang="en-US" dirty="0" err="1" smtClean="0"/>
+              <a:t>IoC</a:t>
+            </a:r>
+            <a:endParaRPr lang="en-US" dirty="0"/>
+          </a:p>
+        </p:txBody>
+      </p:sp>
+    </p:spTree>
+    <p:extLst>
+      <p:ext uri="{BB962C8B-B14F-4D97-AF65-F5344CB8AC3E}">
+        <p14:creationId xmlns:p14="http://schemas.microsoft.com/office/powerpoint/2010/main" val="2818525233"/>
+      </p:ext>
+    </p:extLst>
+  </p:cSld>
+  <p:clrMapOvr>
+    <a:masterClrMapping/>
+  </p:clrMapOvr>
+  <p:timing>
+    <p:tnLst>
+      <p:par>
+        <p:cTn id="1" dur="indefinite" restart="never" nodeType="tmRoot"/>
+      </p:par>
+    </p:tnLst>
+  </p:timing>
+</p:sld>
+</file>
+
+<file path=ppt/slides/slide20.xml><?xml version="1.0" encoding="utf-8"?>
 <p:sld xmlns:a="http://schemas.openxmlformats.org/drawingml/2006/main" xmlns:r="http://schemas.openxmlformats.org/officeDocument/2006/relationships" xmlns:p="http://schemas.openxmlformats.org/presentationml/2006/main">
   <p:cSld>
     <p:spTree>
@@ -4698,129 +4973,7 @@
 </p:sld>
 </file>
 
-<file path=ppt/slides/slide2.xml><?xml version="1.0" encoding="utf-8"?>
-<p:sld xmlns:a="http://schemas.openxmlformats.org/drawingml/2006/main" xmlns:r="http://schemas.openxmlformats.org/officeDocument/2006/relationships" xmlns:p="http://schemas.openxmlformats.org/presentationml/2006/main">
-  <p:cSld>
-    <p:spTree>
-      <p:nvGrpSpPr>
-        <p:cNvPr id="1" name=""/>
-        <p:cNvGrpSpPr/>
-        <p:nvPr/>
-      </p:nvGrpSpPr>
-      <p:grpSpPr>
-        <a:xfrm>
-          <a:off x="0" y="0"/>
-          <a:ext cx="0" cy="0"/>
-          <a:chOff x="0" y="0"/>
-          <a:chExt cx="0" cy="0"/>
-        </a:xfrm>
-      </p:grpSpPr>
-      <p:sp>
-        <p:nvSpPr>
-          <p:cNvPr id="2" name="Title 1"/>
-          <p:cNvSpPr>
-            <a:spLocks noGrp="1"/>
-          </p:cNvSpPr>
-          <p:nvPr>
-            <p:ph type="title"/>
-          </p:nvPr>
-        </p:nvSpPr>
-        <p:spPr/>
-        <p:txBody>
-          <a:bodyPr/>
-          <a:lstStyle/>
-          <a:p>
-            <a:r>
-              <a:rPr lang="en-US" dirty="0" smtClean="0"/>
-              <a:t>Summary</a:t>
-            </a:r>
-            <a:endParaRPr lang="en-US" dirty="0"/>
-          </a:p>
-        </p:txBody>
-      </p:sp>
-      <p:sp>
-        <p:nvSpPr>
-          <p:cNvPr id="3" name="Content Placeholder 2"/>
-          <p:cNvSpPr>
-            <a:spLocks noGrp="1"/>
-          </p:cNvSpPr>
-          <p:nvPr>
-            <p:ph idx="1"/>
-          </p:nvPr>
-        </p:nvSpPr>
-        <p:spPr/>
-        <p:txBody>
-          <a:bodyPr/>
-          <a:lstStyle/>
-          <a:p>
-            <a:r>
-              <a:rPr lang="en-US" dirty="0" smtClean="0"/>
-              <a:t>Overview</a:t>
-            </a:r>
-          </a:p>
-          <a:p>
-            <a:r>
-              <a:rPr lang="en-US" dirty="0" smtClean="0"/>
-              <a:t>Terminology</a:t>
-            </a:r>
-          </a:p>
-          <a:p>
-            <a:r>
-              <a:rPr lang="en-US" dirty="0" smtClean="0"/>
-              <a:t>Dependency Injection</a:t>
-            </a:r>
-          </a:p>
-          <a:p>
-            <a:r>
-              <a:rPr lang="en-US" dirty="0" err="1"/>
-              <a:t>IoC</a:t>
-            </a:r>
-            <a:r>
-              <a:rPr lang="en-US" dirty="0"/>
-              <a:t> </a:t>
-            </a:r>
-            <a:r>
-              <a:rPr lang="en-US" dirty="0" smtClean="0"/>
-              <a:t>Containers</a:t>
-            </a:r>
-          </a:p>
-          <a:p>
-            <a:pPr lvl="1"/>
-            <a:r>
-              <a:rPr lang="en-US" dirty="0" smtClean="0"/>
-              <a:t>Building a Container</a:t>
-            </a:r>
-          </a:p>
-          <a:p>
-            <a:pPr lvl="1"/>
-            <a:r>
-              <a:rPr lang="en-US" dirty="0" smtClean="0"/>
-              <a:t>Mature Projects</a:t>
-            </a:r>
-          </a:p>
-        </p:txBody>
-      </p:sp>
-    </p:spTree>
-    <p:extLst>
-      <p:ext uri="{BB962C8B-B14F-4D97-AF65-F5344CB8AC3E}">
-        <p14:creationId xmlns:p14="http://schemas.microsoft.com/office/powerpoint/2010/main" val="3507662068"/>
-      </p:ext>
-    </p:extLst>
-  </p:cSld>
-  <p:clrMapOvr>
-    <a:masterClrMapping/>
-  </p:clrMapOvr>
-  <p:timing>
-    <p:tnLst>
-      <p:par>
-        <p:cTn id="1" dur="indefinite" restart="never" nodeType="tmRoot"/>
-      </p:par>
-    </p:tnLst>
-  </p:timing>
-</p:sld>
-</file>
-
-<file path=ppt/slides/slide20.xml><?xml version="1.0" encoding="utf-8"?>
+<file path=ppt/slides/slide21.xml><?xml version="1.0" encoding="utf-8"?>
 <p:sld xmlns:a="http://schemas.openxmlformats.org/drawingml/2006/main" xmlns:r="http://schemas.openxmlformats.org/officeDocument/2006/relationships" xmlns:p="http://schemas.openxmlformats.org/presentationml/2006/main">
   <p:cSld>
     <p:spTree>
@@ -4928,7 +5081,7 @@
 </p:sld>
 </file>
 
-<file path=ppt/slides/slide21.xml><?xml version="1.0" encoding="utf-8"?>
+<file path=ppt/slides/slide22.xml><?xml version="1.0" encoding="utf-8"?>
 <p:sld xmlns:a="http://schemas.openxmlformats.org/drawingml/2006/main" xmlns:r="http://schemas.openxmlformats.org/officeDocument/2006/relationships" xmlns:p="http://schemas.openxmlformats.org/presentationml/2006/main">
   <p:cSld>
     <p:spTree>
@@ -5011,7 +5164,7 @@
 </p:sld>
 </file>
 
-<file path=ppt/slides/slide22.xml><?xml version="1.0" encoding="utf-8"?>
+<file path=ppt/slides/slide23.xml><?xml version="1.0" encoding="utf-8"?>
 <p:sld xmlns:a="http://schemas.openxmlformats.org/drawingml/2006/main" xmlns:r="http://schemas.openxmlformats.org/officeDocument/2006/relationships" xmlns:p="http://schemas.openxmlformats.org/presentationml/2006/main">
   <p:cSld>
     <p:spTree>
@@ -5163,128 +5316,78 @@
           <a:p>
             <a:r>
               <a:rPr lang="en-US" dirty="0" smtClean="0"/>
+              <a:t>Summary</a:t>
+            </a:r>
+            <a:endParaRPr lang="en-US" dirty="0"/>
+          </a:p>
+        </p:txBody>
+      </p:sp>
+      <p:sp>
+        <p:nvSpPr>
+          <p:cNvPr id="3" name="Content Placeholder 2"/>
+          <p:cNvSpPr>
+            <a:spLocks noGrp="1"/>
+          </p:cNvSpPr>
+          <p:nvPr>
+            <p:ph idx="1"/>
+          </p:nvPr>
+        </p:nvSpPr>
+        <p:spPr/>
+        <p:txBody>
+          <a:bodyPr/>
+          <a:lstStyle/>
+          <a:p>
+            <a:r>
+              <a:rPr lang="en-US" dirty="0" smtClean="0"/>
+              <a:t>Overview</a:t>
+            </a:r>
+          </a:p>
+          <a:p>
+            <a:r>
+              <a:rPr lang="en-US" dirty="0" smtClean="0"/>
               <a:t>Terminology</a:t>
             </a:r>
-            <a:endParaRPr lang="en-US" dirty="0"/>
-          </a:p>
-        </p:txBody>
-      </p:sp>
-      <p:sp>
-        <p:nvSpPr>
-          <p:cNvPr id="3" name="Content Placeholder 2"/>
-          <p:cNvSpPr>
-            <a:spLocks noGrp="1"/>
-          </p:cNvSpPr>
-          <p:nvPr>
-            <p:ph idx="1"/>
-          </p:nvPr>
-        </p:nvSpPr>
-        <p:spPr/>
-        <p:txBody>
-          <a:bodyPr>
-            <a:normAutofit/>
-          </a:bodyPr>
-          <a:lstStyle/>
-          <a:p>
-            <a:pPr marL="0" indent="0" algn="ctr">
-              <a:buNone/>
-            </a:pPr>
-            <a:r>
-              <a:rPr lang="en-US" sz="3200" dirty="0" smtClean="0"/>
-              <a:t>Dependencies</a:t>
-            </a:r>
-            <a:endParaRPr lang="en-US" sz="3200" dirty="0" smtClean="0"/>
-          </a:p>
-          <a:p>
-            <a:r>
-              <a:rPr lang="en-US" dirty="0" smtClean="0"/>
-              <a:t>“Something” that </a:t>
-            </a:r>
-            <a:r>
-              <a:rPr lang="en-US" dirty="0" smtClean="0"/>
-              <a:t>a class or </a:t>
-            </a:r>
-            <a:r>
-              <a:rPr lang="en-US" dirty="0" smtClean="0"/>
-              <a:t>higher </a:t>
-            </a:r>
-            <a:r>
-              <a:rPr lang="en-US" dirty="0" smtClean="0"/>
-              <a:t>level object needs in order to do its </a:t>
-            </a:r>
-            <a:r>
-              <a:rPr lang="en-US" dirty="0" smtClean="0"/>
-              <a:t>job</a:t>
-            </a:r>
-          </a:p>
-          <a:p>
-            <a:r>
-              <a:rPr lang="en-US" dirty="0" smtClean="0"/>
-              <a:t>Explicit versus Implicit</a:t>
-            </a:r>
-          </a:p>
-          <a:p>
-            <a:r>
-              <a:rPr lang="en-US" dirty="0" smtClean="0"/>
-              <a:t>Examples</a:t>
+          </a:p>
+          <a:p>
+            <a:r>
+              <a:rPr lang="en-US" dirty="0" smtClean="0"/>
+              <a:t>Dependency Injection</a:t>
+            </a:r>
+          </a:p>
+          <a:p>
+            <a:r>
+              <a:rPr lang="en-US" dirty="0" err="1"/>
+              <a:t>IoC</a:t>
+            </a:r>
+            <a:r>
+              <a:rPr lang="en-US" dirty="0"/>
+              <a:t> </a:t>
+            </a:r>
+            <a:r>
+              <a:rPr lang="en-US" dirty="0" smtClean="0"/>
+              <a:t>Containers</a:t>
             </a:r>
           </a:p>
           <a:p>
             <a:pPr lvl="1"/>
             <a:r>
               <a:rPr lang="en-US" dirty="0" smtClean="0"/>
-              <a:t>Framework</a:t>
+              <a:t>Building a Container</a:t>
             </a:r>
           </a:p>
           <a:p>
             <a:pPr lvl="1"/>
             <a:r>
               <a:rPr lang="en-US" dirty="0" smtClean="0"/>
-              <a:t>Third Party Libraries</a:t>
-            </a:r>
-          </a:p>
-          <a:p>
-            <a:pPr lvl="1"/>
-            <a:r>
-              <a:rPr lang="en-US" dirty="0" smtClean="0"/>
-              <a:t>Database</a:t>
-            </a:r>
-          </a:p>
-          <a:p>
-            <a:pPr lvl="1"/>
-            <a:r>
-              <a:rPr lang="en-US" dirty="0" smtClean="0"/>
-              <a:t>File System</a:t>
-            </a:r>
-          </a:p>
-          <a:p>
-            <a:pPr lvl="1"/>
-            <a:r>
-              <a:rPr lang="en-US" dirty="0" smtClean="0"/>
-              <a:t>Email</a:t>
-            </a:r>
-          </a:p>
-          <a:p>
-            <a:pPr lvl="1"/>
-            <a:r>
-              <a:rPr lang="en-US" dirty="0" smtClean="0"/>
-              <a:t>Web Services</a:t>
-            </a:r>
-          </a:p>
-          <a:p>
-            <a:pPr lvl="1"/>
-            <a:r>
-              <a:rPr lang="en-US" dirty="0" smtClean="0"/>
-              <a:t>System Resources (Clock)</a:t>
-            </a:r>
-            <a:endParaRPr lang="en-US" dirty="0"/>
+              <a:t>Mature Projects</a:t>
+            </a:r>
           </a:p>
         </p:txBody>
       </p:sp>
     </p:spTree>
     <p:extLst>
       <p:ext uri="{BB962C8B-B14F-4D97-AF65-F5344CB8AC3E}">
-        <p14:creationId xmlns:p14="http://schemas.microsoft.com/office/powerpoint/2010/main" val="2323160879"/>
+        <p14:creationId xmlns:p14="http://schemas.microsoft.com/office/powerpoint/2010/main" val="3507662068"/>
       </p:ext>
     </p:extLst>
   </p:cSld>
@@ -5363,6 +5466,161 @@
             </a:pPr>
             <a:r>
               <a:rPr lang="en-US" sz="3200" dirty="0" smtClean="0"/>
+              <a:t>Dependencies</a:t>
+            </a:r>
+          </a:p>
+          <a:p>
+            <a:r>
+              <a:rPr lang="en-US" dirty="0" smtClean="0"/>
+              <a:t>“Something” that a class or higher level object needs in order to do its job</a:t>
+            </a:r>
+          </a:p>
+          <a:p>
+            <a:r>
+              <a:rPr lang="en-US" dirty="0" smtClean="0"/>
+              <a:t>Explicit versus Implicit</a:t>
+            </a:r>
+          </a:p>
+          <a:p>
+            <a:r>
+              <a:rPr lang="en-US" dirty="0" smtClean="0"/>
+              <a:t>Examples</a:t>
+            </a:r>
+          </a:p>
+          <a:p>
+            <a:pPr lvl="1"/>
+            <a:r>
+              <a:rPr lang="en-US" dirty="0" smtClean="0"/>
+              <a:t>Framework</a:t>
+            </a:r>
+          </a:p>
+          <a:p>
+            <a:pPr lvl="1"/>
+            <a:r>
+              <a:rPr lang="en-US" dirty="0" smtClean="0"/>
+              <a:t>Third Party Libraries</a:t>
+            </a:r>
+          </a:p>
+          <a:p>
+            <a:pPr lvl="1"/>
+            <a:r>
+              <a:rPr lang="en-US" dirty="0" smtClean="0"/>
+              <a:t>Database</a:t>
+            </a:r>
+          </a:p>
+          <a:p>
+            <a:pPr lvl="1"/>
+            <a:r>
+              <a:rPr lang="en-US" dirty="0" smtClean="0"/>
+              <a:t>File System</a:t>
+            </a:r>
+          </a:p>
+          <a:p>
+            <a:pPr lvl="1"/>
+            <a:r>
+              <a:rPr lang="en-US" dirty="0" smtClean="0"/>
+              <a:t>Email</a:t>
+            </a:r>
+          </a:p>
+          <a:p>
+            <a:pPr lvl="1"/>
+            <a:r>
+              <a:rPr lang="en-US" dirty="0" smtClean="0"/>
+              <a:t>Web Services</a:t>
+            </a:r>
+          </a:p>
+          <a:p>
+            <a:pPr lvl="1"/>
+            <a:r>
+              <a:rPr lang="en-US" dirty="0" smtClean="0"/>
+              <a:t>System Resources (Clock)</a:t>
+            </a:r>
+            <a:endParaRPr lang="en-US" dirty="0"/>
+          </a:p>
+        </p:txBody>
+      </p:sp>
+    </p:spTree>
+    <p:extLst>
+      <p:ext uri="{BB962C8B-B14F-4D97-AF65-F5344CB8AC3E}">
+        <p14:creationId xmlns:p14="http://schemas.microsoft.com/office/powerpoint/2010/main" val="2323160879"/>
+      </p:ext>
+    </p:extLst>
+  </p:cSld>
+  <p:clrMapOvr>
+    <a:masterClrMapping/>
+  </p:clrMapOvr>
+  <p:timing>
+    <p:tnLst>
+      <p:par>
+        <p:cTn id="1" dur="indefinite" restart="never" nodeType="tmRoot"/>
+      </p:par>
+    </p:tnLst>
+  </p:timing>
+</p:sld>
+</file>
+
+<file path=ppt/slides/slide5.xml><?xml version="1.0" encoding="utf-8"?>
+<p:sld xmlns:a="http://schemas.openxmlformats.org/drawingml/2006/main" xmlns:r="http://schemas.openxmlformats.org/officeDocument/2006/relationships" xmlns:p="http://schemas.openxmlformats.org/presentationml/2006/main">
+  <p:cSld>
+    <p:spTree>
+      <p:nvGrpSpPr>
+        <p:cNvPr id="1" name=""/>
+        <p:cNvGrpSpPr/>
+        <p:nvPr/>
+      </p:nvGrpSpPr>
+      <p:grpSpPr>
+        <a:xfrm>
+          <a:off x="0" y="0"/>
+          <a:ext cx="0" cy="0"/>
+          <a:chOff x="0" y="0"/>
+          <a:chExt cx="0" cy="0"/>
+        </a:xfrm>
+      </p:grpSpPr>
+      <p:sp>
+        <p:nvSpPr>
+          <p:cNvPr id="2" name="Title 1"/>
+          <p:cNvSpPr>
+            <a:spLocks noGrp="1"/>
+          </p:cNvSpPr>
+          <p:nvPr>
+            <p:ph type="title"/>
+          </p:nvPr>
+        </p:nvSpPr>
+        <p:spPr/>
+        <p:txBody>
+          <a:bodyPr/>
+          <a:lstStyle/>
+          <a:p>
+            <a:r>
+              <a:rPr lang="en-US" dirty="0" smtClean="0"/>
+              <a:t>Terminology</a:t>
+            </a:r>
+            <a:endParaRPr lang="en-US" dirty="0"/>
+          </a:p>
+        </p:txBody>
+      </p:sp>
+      <p:sp>
+        <p:nvSpPr>
+          <p:cNvPr id="3" name="Content Placeholder 2"/>
+          <p:cNvSpPr>
+            <a:spLocks noGrp="1"/>
+          </p:cNvSpPr>
+          <p:nvPr>
+            <p:ph idx="1"/>
+          </p:nvPr>
+        </p:nvSpPr>
+        <p:spPr/>
+        <p:txBody>
+          <a:bodyPr>
+            <a:normAutofit/>
+          </a:bodyPr>
+          <a:lstStyle/>
+          <a:p>
+            <a:pPr marL="0" indent="0" algn="ctr">
+              <a:buNone/>
+            </a:pPr>
+            <a:r>
+              <a:rPr lang="en-US" sz="3200" dirty="0" smtClean="0"/>
               <a:t>Dependency Inversion Principle</a:t>
             </a:r>
           </a:p>
@@ -5405,7 +5663,7 @@
 </p:sld>
 </file>
 
-<file path=ppt/slides/slide5.xml><?xml version="1.0" encoding="utf-8"?>
+<file path=ppt/slides/slide6.xml><?xml version="1.0" encoding="utf-8"?>
 <p:sld xmlns:a="http://schemas.openxmlformats.org/drawingml/2006/main" xmlns:r="http://schemas.openxmlformats.org/officeDocument/2006/relationships" xmlns:p="http://schemas.openxmlformats.org/presentationml/2006/main">
   <p:cSld>
     <p:spTree>
@@ -5650,11 +5908,7 @@
             <a:pPr algn="ctr"/>
             <a:r>
               <a:rPr lang="en-US" dirty="0" smtClean="0"/>
-              <a:t>Write </a:t>
-            </a:r>
-            <a:r>
-              <a:rPr lang="en-US" dirty="0" smtClean="0"/>
-              <a:t>File</a:t>
+              <a:t>Write File</a:t>
             </a:r>
           </a:p>
         </p:txBody>
@@ -5695,11 +5949,7 @@
             <a:pPr algn="ctr"/>
             <a:r>
               <a:rPr lang="en-US" dirty="0" smtClean="0"/>
-              <a:t>Write </a:t>
-            </a:r>
-            <a:r>
-              <a:rPr lang="en-US" dirty="0" smtClean="0"/>
-              <a:t>Stream</a:t>
+              <a:t>Write Stream</a:t>
             </a:r>
           </a:p>
         </p:txBody>
@@ -5841,7 +6091,7 @@
 </p:sld>
 </file>
 
-<file path=ppt/slides/slide6.xml><?xml version="1.0" encoding="utf-8"?>
+<file path=ppt/slides/slide7.xml><?xml version="1.0" encoding="utf-8"?>
 <p:sld xmlns:a="http://schemas.openxmlformats.org/drawingml/2006/main" xmlns:r="http://schemas.openxmlformats.org/officeDocument/2006/relationships" xmlns:p="http://schemas.openxmlformats.org/presentationml/2006/main">
   <p:cSld>
     <p:spTree>
@@ -6104,11 +6354,7 @@
             <a:pPr algn="ctr"/>
             <a:r>
               <a:rPr lang="en-US" dirty="0" smtClean="0"/>
-              <a:t>Write </a:t>
-            </a:r>
-            <a:r>
-              <a:rPr lang="en-US" dirty="0" smtClean="0"/>
-              <a:t>File</a:t>
+              <a:t>Write File</a:t>
             </a:r>
             <a:endParaRPr lang="en-US" dirty="0"/>
           </a:p>
@@ -6150,11 +6396,7 @@
             <a:pPr algn="ctr"/>
             <a:r>
               <a:rPr lang="en-US" dirty="0" smtClean="0"/>
-              <a:t>Write </a:t>
-            </a:r>
-            <a:r>
-              <a:rPr lang="en-US" dirty="0" smtClean="0"/>
-              <a:t>Stream</a:t>
+              <a:t>Write Stream</a:t>
             </a:r>
             <a:endParaRPr lang="en-US" dirty="0"/>
           </a:p>
@@ -6530,156 +6772,6 @@
 </p:sld>
 </file>
 
-<file path=ppt/slides/slide7.xml><?xml version="1.0" encoding="utf-8"?>
-<p:sld xmlns:a="http://schemas.openxmlformats.org/drawingml/2006/main" xmlns:r="http://schemas.openxmlformats.org/officeDocument/2006/relationships" xmlns:p="http://schemas.openxmlformats.org/presentationml/2006/main">
-  <p:cSld>
-    <p:spTree>
-      <p:nvGrpSpPr>
-        <p:cNvPr id="1" name=""/>
-        <p:cNvGrpSpPr/>
-        <p:nvPr/>
-      </p:nvGrpSpPr>
-      <p:grpSpPr>
-        <a:xfrm>
-          <a:off x="0" y="0"/>
-          <a:ext cx="0" cy="0"/>
-          <a:chOff x="0" y="0"/>
-          <a:chExt cx="0" cy="0"/>
-        </a:xfrm>
-      </p:grpSpPr>
-      <p:sp>
-        <p:nvSpPr>
-          <p:cNvPr id="2" name="Title 1"/>
-          <p:cNvSpPr>
-            <a:spLocks noGrp="1"/>
-          </p:cNvSpPr>
-          <p:nvPr>
-            <p:ph type="title"/>
-          </p:nvPr>
-        </p:nvSpPr>
-        <p:spPr/>
-        <p:txBody>
-          <a:bodyPr/>
-          <a:lstStyle/>
-          <a:p>
-            <a:r>
-              <a:rPr lang="en-US" dirty="0" smtClean="0"/>
-              <a:t>Terminology</a:t>
-            </a:r>
-            <a:endParaRPr lang="en-US" dirty="0"/>
-          </a:p>
-        </p:txBody>
-      </p:sp>
-      <p:sp>
-        <p:nvSpPr>
-          <p:cNvPr id="3" name="Content Placeholder 2"/>
-          <p:cNvSpPr>
-            <a:spLocks noGrp="1"/>
-          </p:cNvSpPr>
-          <p:nvPr>
-            <p:ph idx="1"/>
-          </p:nvPr>
-        </p:nvSpPr>
-        <p:spPr/>
-        <p:txBody>
-          <a:bodyPr>
-            <a:normAutofit/>
-          </a:bodyPr>
-          <a:lstStyle/>
-          <a:p>
-            <a:pPr marL="0" indent="0" algn="ctr">
-              <a:buNone/>
-            </a:pPr>
-            <a:r>
-              <a:rPr lang="en-US" sz="3200" dirty="0" smtClean="0"/>
-              <a:t>Inversion of Control</a:t>
-            </a:r>
-          </a:p>
-          <a:p>
-            <a:r>
-              <a:rPr lang="en-US" dirty="0" smtClean="0"/>
-              <a:t>The “what”</a:t>
-            </a:r>
-          </a:p>
-          <a:p>
-            <a:r>
-              <a:rPr lang="en-US" dirty="0" smtClean="0"/>
-              <a:t>A set of pattern-</a:t>
-            </a:r>
-            <a:r>
-              <a:rPr lang="en-US" dirty="0" err="1" smtClean="0"/>
-              <a:t>ish</a:t>
-            </a:r>
-            <a:r>
-              <a:rPr lang="en-US" dirty="0" smtClean="0"/>
-              <a:t> concepts: interface inversion, flow inversion, creation inversion.</a:t>
-            </a:r>
-          </a:p>
-          <a:p>
-            <a:r>
-              <a:rPr lang="en-US" dirty="0" err="1" smtClean="0"/>
-              <a:t>IoC</a:t>
-            </a:r>
-            <a:r>
-              <a:rPr lang="en-US" dirty="0" smtClean="0"/>
-              <a:t> </a:t>
-            </a:r>
-            <a:r>
-              <a:rPr lang="en-US" dirty="0" smtClean="0"/>
-              <a:t>can be achieved in several </a:t>
-            </a:r>
-            <a:r>
-              <a:rPr lang="en-US" dirty="0" smtClean="0"/>
-              <a:t>ways</a:t>
-            </a:r>
-          </a:p>
-          <a:p>
-            <a:pPr lvl="1"/>
-            <a:r>
-              <a:rPr lang="en-US" dirty="0" smtClean="0"/>
-              <a:t>Factory Pattern</a:t>
-            </a:r>
-          </a:p>
-          <a:p>
-            <a:pPr lvl="1"/>
-            <a:r>
-              <a:rPr lang="en-US" dirty="0" smtClean="0"/>
-              <a:t>Service Locator</a:t>
-            </a:r>
-          </a:p>
-          <a:p>
-            <a:pPr lvl="1"/>
-            <a:r>
-              <a:rPr lang="en-US" dirty="0" smtClean="0"/>
-              <a:t>Dependency Injection</a:t>
-            </a:r>
-            <a:endParaRPr lang="en-US" dirty="0" smtClean="0"/>
-          </a:p>
-          <a:p>
-            <a:endParaRPr lang="en-US" dirty="0" smtClean="0"/>
-          </a:p>
-        </p:txBody>
-      </p:sp>
-    </p:spTree>
-    <p:extLst>
-      <p:ext uri="{BB962C8B-B14F-4D97-AF65-F5344CB8AC3E}">
-        <p14:creationId xmlns:p14="http://schemas.microsoft.com/office/powerpoint/2010/main" val="1736192270"/>
-      </p:ext>
-    </p:extLst>
-  </p:cSld>
-  <p:clrMapOvr>
-    <a:masterClrMapping/>
-  </p:clrMapOvr>
-  <p:timing>
-    <p:tnLst>
-      <p:par>
-        <p:cTn id="1" dur="indefinite" restart="never" nodeType="tmRoot"/>
-      </p:par>
-    </p:tnLst>
-  </p:timing>
-</p:sld>
-</file>
-
 <file path=ppt/slides/slide8.xml><?xml version="1.0" encoding="utf-8"?>
 <p:sld xmlns:a="http://schemas.openxmlformats.org/drawingml/2006/main" xmlns:r="http://schemas.openxmlformats.org/officeDocument/2006/relationships" xmlns:p="http://schemas.openxmlformats.org/presentationml/2006/main">
   <p:cSld>
@@ -6742,30 +6834,61 @@
             </a:pPr>
             <a:r>
               <a:rPr lang="en-US" sz="3200" dirty="0" smtClean="0"/>
+              <a:t>Inversion of Control</a:t>
+            </a:r>
+          </a:p>
+          <a:p>
+            <a:r>
+              <a:rPr lang="en-US" dirty="0" smtClean="0"/>
+              <a:t>The “what”</a:t>
+            </a:r>
+          </a:p>
+          <a:p>
+            <a:r>
+              <a:rPr lang="en-US" dirty="0" smtClean="0"/>
+              <a:t>A set of pattern-</a:t>
+            </a:r>
+            <a:r>
+              <a:rPr lang="en-US" dirty="0" err="1" smtClean="0"/>
+              <a:t>ish</a:t>
+            </a:r>
+            <a:r>
+              <a:rPr lang="en-US" dirty="0" smtClean="0"/>
+              <a:t> concepts: interface inversion, flow inversion, creation inversion.</a:t>
+            </a:r>
+          </a:p>
+          <a:p>
+            <a:r>
+              <a:rPr lang="en-US" dirty="0" err="1" smtClean="0"/>
+              <a:t>IoC</a:t>
+            </a:r>
+            <a:r>
+              <a:rPr lang="en-US" dirty="0" smtClean="0"/>
+              <a:t> can be achieved in several ways</a:t>
+            </a:r>
+          </a:p>
+          <a:p>
+            <a:pPr lvl="1"/>
+            <a:r>
+              <a:rPr lang="en-US" dirty="0" smtClean="0"/>
+              <a:t>Factory Pattern</a:t>
+            </a:r>
+          </a:p>
+          <a:p>
+            <a:pPr lvl="1"/>
+            <a:r>
+              <a:rPr lang="en-US" dirty="0" smtClean="0"/>
+              <a:t>Service Locator</a:t>
+            </a:r>
+          </a:p>
+          <a:p>
+            <a:pPr lvl="1"/>
+            <a:r>
+              <a:rPr lang="en-US" dirty="0" smtClean="0"/>
               <a:t>Dependency Injection</a:t>
             </a:r>
           </a:p>
           <a:p>
-            <a:r>
-              <a:rPr lang="en-US" dirty="0" smtClean="0"/>
-              <a:t>One of the how(s)</a:t>
-            </a:r>
-          </a:p>
-          <a:p>
-            <a:r>
-              <a:rPr lang="en-US" dirty="0" smtClean="0"/>
-              <a:t>A form of Inversion of Control implemented by giving an object its </a:t>
-            </a:r>
-            <a:r>
-              <a:rPr lang="en-US" dirty="0" smtClean="0"/>
-              <a:t>dependencies</a:t>
-            </a:r>
-          </a:p>
-          <a:p>
-            <a:r>
-              <a:rPr lang="en-US" dirty="0" smtClean="0"/>
-              <a:t>The Hollywood Principle</a:t>
-            </a:r>
             <a:endParaRPr lang="en-US" dirty="0" smtClean="0"/>
           </a:p>
         </p:txBody>
@@ -6773,7 +6896,7 @@
     </p:spTree>
     <p:extLst>
       <p:ext uri="{BB962C8B-B14F-4D97-AF65-F5344CB8AC3E}">
-        <p14:creationId xmlns:p14="http://schemas.microsoft.com/office/powerpoint/2010/main" val="595425355"/>
+        <p14:creationId xmlns:p14="http://schemas.microsoft.com/office/powerpoint/2010/main" val="1736192270"/>
       </p:ext>
     </p:extLst>
   </p:cSld>
@@ -6851,40 +6974,26 @@
               <a:buNone/>
             </a:pPr>
             <a:r>
-              <a:rPr lang="en-US" sz="3200" dirty="0" err="1" smtClean="0"/>
-              <a:t>IoC</a:t>
-            </a:r>
-            <a:r>
               <a:rPr lang="en-US" sz="3200" dirty="0" smtClean="0"/>
-              <a:t> Container</a:t>
-            </a:r>
-          </a:p>
-          <a:p>
-            <a:r>
-              <a:rPr lang="en-US" dirty="0" smtClean="0"/>
-              <a:t>A framework for doing dependency injection.</a:t>
-            </a:r>
-          </a:p>
-          <a:p>
-            <a:r>
-              <a:rPr lang="en-US" dirty="0" smtClean="0"/>
-              <a:t>Popular containers include: Structure Map, </a:t>
-            </a:r>
-            <a:r>
-              <a:rPr lang="en-US" dirty="0" err="1" smtClean="0"/>
-              <a:t>Ninject</a:t>
-            </a:r>
-            <a:r>
-              <a:rPr lang="en-US" dirty="0" smtClean="0"/>
-              <a:t>, </a:t>
-            </a:r>
-            <a:r>
-              <a:rPr lang="en-US" dirty="0" err="1" smtClean="0"/>
-              <a:t>Castle.Windsor</a:t>
-            </a:r>
-            <a:r>
-              <a:rPr lang="en-US" dirty="0" smtClean="0"/>
-              <a:t>, Unity</a:t>
+              <a:t>Dependency Injection</a:t>
+            </a:r>
+          </a:p>
+          <a:p>
+            <a:r>
+              <a:rPr lang="en-US" dirty="0" smtClean="0"/>
+              <a:t>One of the how(s)</a:t>
+            </a:r>
+          </a:p>
+          <a:p>
+            <a:r>
+              <a:rPr lang="en-US" dirty="0" smtClean="0"/>
+              <a:t>A form of Inversion of Control implemented by giving an object its dependencies</a:t>
+            </a:r>
+          </a:p>
+          <a:p>
+            <a:r>
+              <a:rPr lang="en-US" dirty="0" smtClean="0"/>
+              <a:t>The Hollywood Principle</a:t>
             </a:r>
           </a:p>
         </p:txBody>
@@ -6892,7 +7001,7 @@
     </p:spTree>
     <p:extLst>
       <p:ext uri="{BB962C8B-B14F-4D97-AF65-F5344CB8AC3E}">
-        <p14:creationId xmlns:p14="http://schemas.microsoft.com/office/powerpoint/2010/main" val="999399664"/>
+        <p14:creationId xmlns:p14="http://schemas.microsoft.com/office/powerpoint/2010/main" val="595425355"/>
       </p:ext>
     </p:extLst>
   </p:cSld>
@@ -7134,7 +7243,7 @@
   <a:extraClrSchemeLst/>
   <a:extLst>
     <a:ext uri="{05A4C25C-085E-4340-85A3-A5531E510DB2}">
-      <thm15:themeFamily xmlns:thm15="http://schemas.microsoft.com/office/thememl/2012/main" name="Frame" id="{F226E7A2-7162-461C-9490-D27D9DC04E43}" vid="{629A0216-3BBD-45C0-B63F-2683BEA18F60}"/>
+      <thm15:themeFamily xmlns="" xmlns:thm15="http://schemas.microsoft.com/office/thememl/2012/main" name="Frame" id="{F226E7A2-7162-461C-9490-D27D9DC04E43}" vid="{629A0216-3BBD-45C0-B63F-2683BEA18F60}"/>
     </a:ext>
   </a:extLst>
 </a:theme>

</xml_diff>